<commit_message>
[docs] update ppt of sprint 2
</commit_message>
<xml_diff>
--- a/documentation/sprint2/progress _report_pre2.pptx
+++ b/documentation/sprint2/progress _report_pre2.pptx
@@ -4157,7 +4157,7 @@
           <a:p>
             <a:fld id="{DD4885B1-F2D1-4422-9BEB-519C2FD4F614}" type="datetimeFigureOut">
               <a:rPr lang="zh-CN" altLang="en-US" smtClean="0"/>
-              <a:t>2022/5/8</a:t>
+              <a:t>2022/5/9</a:t>
             </a:fld>
             <a:endParaRPr lang="zh-CN" altLang="en-US"/>
           </a:p>
@@ -6370,7 +6370,7 @@
           <a:p>
             <a:fld id="{53842D3D-8D14-4D33-8568-47201513AB57}" type="datetimeFigureOut">
               <a:rPr lang="zh-CN" altLang="en-US" smtClean="0"/>
-              <a:t>2022/5/8</a:t>
+              <a:t>2022/5/9</a:t>
             </a:fld>
             <a:endParaRPr lang="zh-CN" altLang="en-US"/>
           </a:p>
@@ -6621,7 +6621,7 @@
           <a:p>
             <a:fld id="{53842D3D-8D14-4D33-8568-47201513AB57}" type="datetimeFigureOut">
               <a:rPr lang="zh-CN" altLang="en-US" smtClean="0"/>
-              <a:t>2022/5/8</a:t>
+              <a:t>2022/5/9</a:t>
             </a:fld>
             <a:endParaRPr lang="zh-CN" altLang="en-US"/>
           </a:p>
@@ -6935,7 +6935,7 @@
           <a:p>
             <a:fld id="{53842D3D-8D14-4D33-8568-47201513AB57}" type="datetimeFigureOut">
               <a:rPr lang="zh-CN" altLang="en-US" smtClean="0"/>
-              <a:t>2022/5/8</a:t>
+              <a:t>2022/5/9</a:t>
             </a:fld>
             <a:endParaRPr lang="zh-CN" altLang="en-US"/>
           </a:p>
@@ -7268,7 +7268,7 @@
           <a:p>
             <a:fld id="{53842D3D-8D14-4D33-8568-47201513AB57}" type="datetimeFigureOut">
               <a:rPr lang="zh-CN" altLang="en-US" smtClean="0"/>
-              <a:t>2022/5/8</a:t>
+              <a:t>2022/5/9</a:t>
             </a:fld>
             <a:endParaRPr lang="zh-CN" altLang="en-US"/>
           </a:p>
@@ -7582,7 +7582,7 @@
           <a:p>
             <a:fld id="{53842D3D-8D14-4D33-8568-47201513AB57}" type="datetimeFigureOut">
               <a:rPr lang="zh-CN" altLang="en-US" smtClean="0"/>
-              <a:t>2022/5/8</a:t>
+              <a:t>2022/5/9</a:t>
             </a:fld>
             <a:endParaRPr lang="zh-CN" altLang="en-US"/>
           </a:p>
@@ -7975,7 +7975,7 @@
           <a:p>
             <a:fld id="{53842D3D-8D14-4D33-8568-47201513AB57}" type="datetimeFigureOut">
               <a:rPr lang="zh-CN" altLang="en-US" smtClean="0"/>
-              <a:t>2022/5/8</a:t>
+              <a:t>2022/5/9</a:t>
             </a:fld>
             <a:endParaRPr lang="zh-CN" altLang="en-US"/>
           </a:p>
@@ -8145,7 +8145,7 @@
           <a:p>
             <a:fld id="{53842D3D-8D14-4D33-8568-47201513AB57}" type="datetimeFigureOut">
               <a:rPr lang="zh-CN" altLang="en-US" smtClean="0"/>
-              <a:t>2022/5/8</a:t>
+              <a:t>2022/5/9</a:t>
             </a:fld>
             <a:endParaRPr lang="zh-CN" altLang="en-US"/>
           </a:p>
@@ -8325,7 +8325,7 @@
           <a:p>
             <a:fld id="{53842D3D-8D14-4D33-8568-47201513AB57}" type="datetimeFigureOut">
               <a:rPr lang="zh-CN" altLang="en-US" smtClean="0"/>
-              <a:t>2022/5/8</a:t>
+              <a:t>2022/5/9</a:t>
             </a:fld>
             <a:endParaRPr lang="zh-CN" altLang="en-US"/>
           </a:p>
@@ -8525,7 +8525,7 @@
           <a:p>
             <a:fld id="{53842D3D-8D14-4D33-8568-47201513AB57}" type="datetimeFigureOut">
               <a:rPr lang="zh-CN" altLang="en-US" smtClean="0"/>
-              <a:t>2022/5/8</a:t>
+              <a:t>2022/5/9</a:t>
             </a:fld>
             <a:endParaRPr lang="zh-CN" altLang="en-US"/>
           </a:p>
@@ -8772,7 +8772,7 @@
           <a:p>
             <a:fld id="{53842D3D-8D14-4D33-8568-47201513AB57}" type="datetimeFigureOut">
               <a:rPr lang="zh-CN" altLang="en-US" smtClean="0"/>
-              <a:t>2022/5/8</a:t>
+              <a:t>2022/5/9</a:t>
             </a:fld>
             <a:endParaRPr lang="zh-CN" altLang="en-US"/>
           </a:p>
@@ -9004,7 +9004,7 @@
           <a:p>
             <a:fld id="{53842D3D-8D14-4D33-8568-47201513AB57}" type="datetimeFigureOut">
               <a:rPr lang="zh-CN" altLang="en-US" smtClean="0"/>
-              <a:t>2022/5/8</a:t>
+              <a:t>2022/5/9</a:t>
             </a:fld>
             <a:endParaRPr lang="zh-CN" altLang="en-US"/>
           </a:p>
@@ -9378,7 +9378,7 @@
           <a:p>
             <a:fld id="{53842D3D-8D14-4D33-8568-47201513AB57}" type="datetimeFigureOut">
               <a:rPr lang="zh-CN" altLang="en-US" smtClean="0"/>
-              <a:t>2022/5/8</a:t>
+              <a:t>2022/5/9</a:t>
             </a:fld>
             <a:endParaRPr lang="zh-CN" altLang="en-US"/>
           </a:p>
@@ -9501,7 +9501,7 @@
           <a:p>
             <a:fld id="{53842D3D-8D14-4D33-8568-47201513AB57}" type="datetimeFigureOut">
               <a:rPr lang="zh-CN" altLang="en-US" smtClean="0"/>
-              <a:t>2022/5/8</a:t>
+              <a:t>2022/5/9</a:t>
             </a:fld>
             <a:endParaRPr lang="zh-CN" altLang="en-US"/>
           </a:p>
@@ -9596,7 +9596,7 @@
           <a:p>
             <a:fld id="{53842D3D-8D14-4D33-8568-47201513AB57}" type="datetimeFigureOut">
               <a:rPr lang="zh-CN" altLang="en-US" smtClean="0"/>
-              <a:t>2022/5/8</a:t>
+              <a:t>2022/5/9</a:t>
             </a:fld>
             <a:endParaRPr lang="zh-CN" altLang="en-US"/>
           </a:p>
@@ -9851,7 +9851,7 @@
           <a:p>
             <a:fld id="{53842D3D-8D14-4D33-8568-47201513AB57}" type="datetimeFigureOut">
               <a:rPr lang="zh-CN" altLang="en-US" smtClean="0"/>
-              <a:t>2022/5/8</a:t>
+              <a:t>2022/5/9</a:t>
             </a:fld>
             <a:endParaRPr lang="zh-CN" altLang="en-US"/>
           </a:p>
@@ -10156,7 +10156,7 @@
           <a:p>
             <a:fld id="{53842D3D-8D14-4D33-8568-47201513AB57}" type="datetimeFigureOut">
               <a:rPr lang="zh-CN" altLang="en-US" smtClean="0"/>
-              <a:t>2022/5/8</a:t>
+              <a:t>2022/5/9</a:t>
             </a:fld>
             <a:endParaRPr lang="zh-CN" altLang="en-US"/>
           </a:p>
@@ -10858,7 +10858,7 @@
           <a:p>
             <a:fld id="{53842D3D-8D14-4D33-8568-47201513AB57}" type="datetimeFigureOut">
               <a:rPr lang="zh-CN" altLang="en-US" smtClean="0"/>
-              <a:t>2022/5/8</a:t>
+              <a:t>2022/5/9</a:t>
             </a:fld>
             <a:endParaRPr lang="zh-CN" altLang="en-US"/>
           </a:p>
@@ -12281,7 +12281,7 @@
         </p:blipFill>
         <p:spPr>
           <a:xfrm>
-            <a:off x="542232" y="2830579"/>
+            <a:off x="503949" y="2529606"/>
             <a:ext cx="7506746" cy="3351012"/>
           </a:xfrm>
           <a:prstGeom prst="rect">
@@ -12289,6 +12289,51 @@
           </a:prstGeom>
         </p:spPr>
       </p:pic>
+      <p:sp>
+        <p:nvSpPr>
+          <p:cNvPr id="6" name="文本框 5">
+            <a:extLst>
+              <a:ext uri="{FF2B5EF4-FFF2-40B4-BE49-F238E27FC236}">
+                <a16:creationId xmlns:a16="http://schemas.microsoft.com/office/drawing/2014/main" id="{C81AAB74-358E-8CD4-2CC9-54EE9C295313}"/>
+              </a:ext>
+            </a:extLst>
+          </p:cNvPr>
+          <p:cNvSpPr txBox="1"/>
+          <p:nvPr/>
+        </p:nvSpPr>
+        <p:spPr>
+          <a:xfrm>
+            <a:off x="2418644" y="6130447"/>
+            <a:ext cx="3677356" cy="369332"/>
+          </a:xfrm>
+          <a:prstGeom prst="rect">
+            <a:avLst/>
+          </a:prstGeom>
+          <a:noFill/>
+        </p:spPr>
+        <p:txBody>
+          <a:bodyPr wrap="square">
+            <a:spAutoFit/>
+          </a:bodyPr>
+          <a:lstStyle/>
+          <a:p>
+            <a:r>
+              <a:rPr lang="zh-CN" altLang="en-US" u="sng" dirty="0">
+                <a:solidFill>
+                  <a:schemeClr val="tx2"/>
+                </a:solidFill>
+                <a:hlinkClick r:id="rId4"/>
+              </a:rPr>
+              <a:t>https://global.abb/group/en</a:t>
+            </a:r>
+            <a:endParaRPr lang="zh-CN" altLang="en-US" u="sng" dirty="0">
+              <a:solidFill>
+                <a:schemeClr val="tx2"/>
+              </a:solidFill>
+            </a:endParaRPr>
+          </a:p>
+        </p:txBody>
+      </p:sp>
     </p:spTree>
     <p:extLst>
       <p:ext uri="{BB962C8B-B14F-4D97-AF65-F5344CB8AC3E}">
@@ -13623,8 +13668,8 @@
   <p:transition spd="slow">
     <p:push dir="u"/>
   </p:transition>
-  <mc:AlternateContent xmlns:mc="http://schemas.openxmlformats.org/markup-compatibility/2006">
-    <mc:Choice xmlns:p14="http://schemas.microsoft.com/office/powerpoint/2010/main" Requires="p14">
+  <mc:AlternateContent xmlns:mc="http://schemas.openxmlformats.org/markup-compatibility/2006" xmlns:p14="http://schemas.microsoft.com/office/powerpoint/2010/main">
+    <mc:Choice Requires="p14">
       <p:timing>
         <p:tnLst>
           <p:par>
@@ -13827,7 +13872,7 @@
         </p:bldLst>
       </p:timing>
     </mc:Choice>
-    <mc:Fallback>
+    <mc:Fallback xmlns="">
       <p:timing>
         <p:tnLst>
           <p:par>
@@ -17516,8 +17561,8 @@
   <p:transition spd="slow">
     <p:push dir="u"/>
   </p:transition>
-  <mc:AlternateContent xmlns:mc="http://schemas.openxmlformats.org/markup-compatibility/2006">
-    <mc:Choice xmlns:p14="http://schemas.microsoft.com/office/powerpoint/2010/main" Requires="p14">
+  <mc:AlternateContent xmlns:mc="http://schemas.openxmlformats.org/markup-compatibility/2006" xmlns:p14="http://schemas.microsoft.com/office/powerpoint/2010/main">
+    <mc:Choice Requires="p14">
       <p:timing>
         <p:tnLst>
           <p:par>
@@ -17720,7 +17765,7 @@
         </p:bldLst>
       </p:timing>
     </mc:Choice>
-    <mc:Fallback>
+    <mc:Fallback xmlns="">
       <p:timing>
         <p:tnLst>
           <p:par>

</xml_diff>

<commit_message>
MGAF-18 [feat] Implemented post editing
Signed-off-by: Ryuhane <natsumeryuhane@gmail.com>
</commit_message>
<xml_diff>
--- a/documentation/sprint2/progress _report_pre2.pptx
+++ b/documentation/sprint2/progress _report_pre2.pptx
@@ -1952,21 +1952,21 @@
     <dgm:cxn modelId="{DB7D302F-213D-49FC-864A-8D69748728D6}" srcId="{A5576C7B-6A41-4A8A-A40F-2B6930895098}" destId="{38E1598B-61E4-4E9C-8C8F-5CC671ABF3D4}" srcOrd="4" destOrd="0" parTransId="{3226522A-B620-42FF-A5A5-6734C28022DC}" sibTransId="{CE0DB7DF-824E-41FC-AA84-830CA0DD9F18}"/>
     <dgm:cxn modelId="{B63C8939-B306-4224-A04B-7A4A965445EC}" type="presOf" srcId="{ECDF1775-D113-454F-AFCA-DC930F262B71}" destId="{829E7783-9649-4053-83A0-18F42971DB73}" srcOrd="0" destOrd="1" presId="urn:microsoft.com/office/officeart/2005/8/layout/hList1"/>
     <dgm:cxn modelId="{0E206340-2344-42DC-9AFB-6BEB3359D088}" type="presOf" srcId="{03C0BCD8-EC0D-4EE4-A169-C271486C512E}" destId="{0486DCD5-520F-4501-9D5E-C8248A870F7C}" srcOrd="0" destOrd="0" presId="urn:microsoft.com/office/officeart/2005/8/layout/hList1"/>
-    <dgm:cxn modelId="{8CBC4E5D-EADC-4652-B017-39079EEC0195}" type="presOf" srcId="{0AF0B3D3-DD8B-4BD1-A2AE-6ED8433622C5}" destId="{829E7783-9649-4053-83A0-18F42971DB73}" srcOrd="0" destOrd="3" presId="urn:microsoft.com/office/officeart/2005/8/layout/hList1"/>
     <dgm:cxn modelId="{AD440243-4DDB-4439-B4F3-43D5D35B936B}" type="presOf" srcId="{A23D5981-7981-43F4-AD95-C13376A6C33C}" destId="{2BF263AF-E203-4D7D-87BC-83E13601B134}" srcOrd="0" destOrd="2" presId="urn:microsoft.com/office/officeart/2005/8/layout/hList1"/>
     <dgm:cxn modelId="{B21D2C45-420A-479D-B4B3-095943EF2DB4}" srcId="{B994D87A-13F2-44D7-B0FB-F57A0F5597CC}" destId="{E841F735-82C5-4264-8A3F-0644E8091B97}" srcOrd="0" destOrd="0" parTransId="{1D5D6E32-286A-4E08-886B-1DEF81656607}" sibTransId="{4D47B209-F510-4412-85A9-50668F244534}"/>
     <dgm:cxn modelId="{0FD89748-C876-497D-8A88-CC7D2474EC88}" type="presOf" srcId="{3D477DBD-5909-4E3A-9B81-2ED396E01BBB}" destId="{CD9D0453-929F-4315-9132-E4024BBDEAA9}" srcOrd="0" destOrd="4" presId="urn:microsoft.com/office/officeart/2005/8/layout/hList1"/>
+    <dgm:cxn modelId="{CC0F504F-F1F7-4AC5-BBFE-5608B173A814}" srcId="{03C0BCD8-EC0D-4EE4-A169-C271486C512E}" destId="{B994D87A-13F2-44D7-B0FB-F57A0F5597CC}" srcOrd="0" destOrd="0" parTransId="{30C38FF1-7EC3-48EF-BEFE-3A5E009BA274}" sibTransId="{2703F9C0-00DD-4082-9CEB-6B48C27B4305}"/>
+    <dgm:cxn modelId="{B2660252-71D9-4107-96C1-5CDEB4D18146}" type="presOf" srcId="{1A34536C-B1EB-4EC9-9B42-A78A7B8479E2}" destId="{CD9D0453-929F-4315-9132-E4024BBDEAA9}" srcOrd="0" destOrd="3" presId="urn:microsoft.com/office/officeart/2005/8/layout/hList1"/>
+    <dgm:cxn modelId="{8D37D053-6AD9-485C-A941-682FF8236BD1}" type="presOf" srcId="{2C2ADE37-70FF-4687-B4E7-27BDE749AD2A}" destId="{829E7783-9649-4053-83A0-18F42971DB73}" srcOrd="0" destOrd="2" presId="urn:microsoft.com/office/officeart/2005/8/layout/hList1"/>
+    <dgm:cxn modelId="{EDBA9F56-5456-4F3F-9AA7-A12374F8E4B3}" srcId="{03C0BCD8-EC0D-4EE4-A169-C271486C512E}" destId="{A5576C7B-6A41-4A8A-A40F-2B6930895098}" srcOrd="2" destOrd="0" parTransId="{A0E5C1ED-8FD0-478F-9877-420C3AF7D0D9}" sibTransId="{240C8E93-27EF-4C3C-8E55-54AD662BD4F7}"/>
+    <dgm:cxn modelId="{8CBC4E5D-EADC-4652-B017-39079EEC0195}" type="presOf" srcId="{0AF0B3D3-DD8B-4BD1-A2AE-6ED8433622C5}" destId="{829E7783-9649-4053-83A0-18F42971DB73}" srcOrd="0" destOrd="3" presId="urn:microsoft.com/office/officeart/2005/8/layout/hList1"/>
     <dgm:cxn modelId="{2C135A6C-BCD1-4E61-B345-6A2E0CD7D4D8}" type="presOf" srcId="{B9714E11-16A5-4B82-8F3F-D9875F44E82A}" destId="{829E7783-9649-4053-83A0-18F42971DB73}" srcOrd="0" destOrd="0" presId="urn:microsoft.com/office/officeart/2005/8/layout/hList1"/>
     <dgm:cxn modelId="{605B606D-56B6-4AE2-8B2D-402072E2FF58}" type="presOf" srcId="{B994D87A-13F2-44D7-B0FB-F57A0F5597CC}" destId="{66522DEE-74FD-4801-9F42-7500E5B9481B}" srcOrd="0" destOrd="0" presId="urn:microsoft.com/office/officeart/2005/8/layout/hList1"/>
-    <dgm:cxn modelId="{CC0F504F-F1F7-4AC5-BBFE-5608B173A814}" srcId="{03C0BCD8-EC0D-4EE4-A169-C271486C512E}" destId="{B994D87A-13F2-44D7-B0FB-F57A0F5597CC}" srcOrd="0" destOrd="0" parTransId="{30C38FF1-7EC3-48EF-BEFE-3A5E009BA274}" sibTransId="{2703F9C0-00DD-4082-9CEB-6B48C27B4305}"/>
     <dgm:cxn modelId="{BD43506F-59F6-48C5-909B-0AD3CC03C04B}" srcId="{B994D87A-13F2-44D7-B0FB-F57A0F5597CC}" destId="{FBD66A73-3E17-43B6-A192-1974D9B09666}" srcOrd="2" destOrd="0" parTransId="{A2D3BAFD-87D4-44EC-BCE1-70D6EB9C1BB3}" sibTransId="{3D045D4A-EF46-4F1A-A61A-970BAD46B7C3}"/>
     <dgm:cxn modelId="{1DF43C70-4290-4AC9-A520-8FFE38BE684E}" type="presOf" srcId="{38E1598B-61E4-4E9C-8C8F-5CC671ABF3D4}" destId="{2BF263AF-E203-4D7D-87BC-83E13601B134}" srcOrd="0" destOrd="4" presId="urn:microsoft.com/office/officeart/2005/8/layout/hList1"/>
-    <dgm:cxn modelId="{B2660252-71D9-4107-96C1-5CDEB4D18146}" type="presOf" srcId="{1A34536C-B1EB-4EC9-9B42-A78A7B8479E2}" destId="{CD9D0453-929F-4315-9132-E4024BBDEAA9}" srcOrd="0" destOrd="3" presId="urn:microsoft.com/office/officeart/2005/8/layout/hList1"/>
     <dgm:cxn modelId="{5F5C4172-BA7B-4052-AFD1-5EF17C2DAD19}" type="presOf" srcId="{BAE3FEA7-DCB3-44C9-8219-7F4CDD0651D9}" destId="{2BF263AF-E203-4D7D-87BC-83E13601B134}" srcOrd="0" destOrd="3" presId="urn:microsoft.com/office/officeart/2005/8/layout/hList1"/>
-    <dgm:cxn modelId="{8D37D053-6AD9-485C-A941-682FF8236BD1}" type="presOf" srcId="{2C2ADE37-70FF-4687-B4E7-27BDE749AD2A}" destId="{829E7783-9649-4053-83A0-18F42971DB73}" srcOrd="0" destOrd="2" presId="urn:microsoft.com/office/officeart/2005/8/layout/hList1"/>
     <dgm:cxn modelId="{C1CF9575-B97E-46D0-9F3F-6B4F8DB6E9C9}" srcId="{41041FAE-F738-44B5-ABFB-C0A7FFB175FD}" destId="{2C2ADE37-70FF-4687-B4E7-27BDE749AD2A}" srcOrd="2" destOrd="0" parTransId="{7597A5C6-18BF-4D8E-8D6B-B368D911BF3B}" sibTransId="{B93BB729-21F2-4662-8830-B02C37DD6877}"/>
     <dgm:cxn modelId="{48089376-B8AC-40A4-8751-76F1E98D61AE}" srcId="{A5576C7B-6A41-4A8A-A40F-2B6930895098}" destId="{0FE4414D-5233-48D3-890F-35B5D9DE43E3}" srcOrd="0" destOrd="0" parTransId="{F0A43390-C5DC-4DD8-8ACB-475D7844ABCE}" sibTransId="{A970E553-A3A0-41F7-85B4-4D8F596B221B}"/>
-    <dgm:cxn modelId="{EDBA9F56-5456-4F3F-9AA7-A12374F8E4B3}" srcId="{03C0BCD8-EC0D-4EE4-A169-C271486C512E}" destId="{A5576C7B-6A41-4A8A-A40F-2B6930895098}" srcOrd="2" destOrd="0" parTransId="{A0E5C1ED-8FD0-478F-9877-420C3AF7D0D9}" sibTransId="{240C8E93-27EF-4C3C-8E55-54AD662BD4F7}"/>
     <dgm:cxn modelId="{38AB2F84-A501-4FB2-A424-ADF6809DFCA2}" type="presOf" srcId="{0BA39D71-D042-4F9A-B5FF-46F36D214E71}" destId="{CD9D0453-929F-4315-9132-E4024BBDEAA9}" srcOrd="0" destOrd="1" presId="urn:microsoft.com/office/officeart/2005/8/layout/hList1"/>
     <dgm:cxn modelId="{FF204C8C-6C1B-457D-A19C-7A026A8ABDB0}" type="presOf" srcId="{E841F735-82C5-4264-8A3F-0644E8091B97}" destId="{CD9D0453-929F-4315-9132-E4024BBDEAA9}" srcOrd="0" destOrd="0" presId="urn:microsoft.com/office/officeart/2005/8/layout/hList1"/>
     <dgm:cxn modelId="{CBEA3B94-5192-449A-8328-0C1699C14D1C}" srcId="{A5576C7B-6A41-4A8A-A40F-2B6930895098}" destId="{BAE3FEA7-DCB3-44C9-8219-7F4CDD0651D9}" srcOrd="3" destOrd="0" parTransId="{64729EA0-8F7F-43C2-99FC-050BA62D60D8}" sibTransId="{C6042D08-F385-4295-AB19-44F928EC0D4F}"/>
@@ -11466,7 +11466,21 @@
                 <a:latin typeface="Times New Roman" panose="02020603050405020304" pitchFamily="18" charset="0"/>
                 <a:cs typeface="Times New Roman" panose="02020603050405020304" pitchFamily="18" charset="0"/>
               </a:rPr>
-              <a:t>Group members: He Xinyi ,Cao Yulong, Chen Rui, Lu </a:t>
+              <a:t>Group members: He Xinyi,</a:t>
+            </a:r>
+            <a:r>
+              <a:rPr lang="zh-CN" altLang="en-US" sz="2000" b="1" dirty="0">
+                <a:latin typeface="Times New Roman" panose="02020603050405020304" pitchFamily="18" charset="0"/>
+                <a:cs typeface="Times New Roman" panose="02020603050405020304" pitchFamily="18" charset="0"/>
+              </a:rPr>
+              <a:t> </a:t>
+            </a:r>
+            <a:r>
+              <a:rPr lang="en-US" altLang="zh-CN" sz="2000" b="1" dirty="0">
+                <a:latin typeface="Times New Roman" panose="02020603050405020304" pitchFamily="18" charset="0"/>
+                <a:cs typeface="Times New Roman" panose="02020603050405020304" pitchFamily="18" charset="0"/>
+              </a:rPr>
+              <a:t>Cao Yulong, Chen Rui, Lu </a:t>
             </a:r>
             <a:r>
               <a:rPr lang="en-US" altLang="zh-CN" sz="2000" b="1" dirty="0" err="1">

</xml_diff>